<commit_message>
Added custom CSS for every page.
</commit_message>
<xml_diff>
--- a/quiz_program/static/assets/Recuerda Vector Logos.pptx
+++ b/quiz_program/static/assets/Recuerda Vector Logos.pptx
@@ -9,10 +9,12 @@
     <p:sldId id="258" r:id="rId3"/>
     <p:sldId id="261" r:id="rId4"/>
     <p:sldId id="262" r:id="rId5"/>
-    <p:sldId id="264" r:id="rId6"/>
-    <p:sldId id="265" r:id="rId7"/>
-    <p:sldId id="263" r:id="rId8"/>
-    <p:sldId id="266" r:id="rId9"/>
+    <p:sldId id="267" r:id="rId6"/>
+    <p:sldId id="264" r:id="rId7"/>
+    <p:sldId id="265" r:id="rId8"/>
+    <p:sldId id="263" r:id="rId9"/>
+    <p:sldId id="268" r:id="rId10"/>
+    <p:sldId id="266" r:id="rId11"/>
   </p:sldIdLst>
   <p:sldSz cx="12192000" cy="6858000"/>
   <p:notesSz cx="6858000" cy="9144000"/>
@@ -122,7 +124,7 @@
 <file path=ppt/revisionInfo.xml><?xml version="1.0" encoding="utf-8"?>
 <p1510:revInfo xmlns:a="http://schemas.openxmlformats.org/drawingml/2006/main" xmlns:r="http://schemas.openxmlformats.org/officeDocument/2006/relationships" xmlns:p1510="http://schemas.microsoft.com/office/powerpoint/2015/10/main">
   <p1510:revLst>
-    <p1510:client id="{37DC6012-C9E4-4526-AC9E-21302A4F6DEE}" v="22" dt="2020-07-29T16:53:24.359"/>
+    <p1510:client id="{37DC6012-C9E4-4526-AC9E-21302A4F6DEE}" v="32" dt="2020-08-08T09:59:25.624"/>
   </p1510:revLst>
 </p1510:revInfo>
 </file>
@@ -227,12 +229,12 @@
   <pc:docChgLst>
     <pc:chgData name="Jonathan Steel" userId="c59b30b6-b53b-4907-b963-706b6ac23b64" providerId="ADAL" clId="{37DC6012-C9E4-4526-AC9E-21302A4F6DEE}"/>
     <pc:docChg chg="undo custSel addSld delSld modSld sldOrd">
-      <pc:chgData name="Jonathan Steel" userId="c59b30b6-b53b-4907-b963-706b6ac23b64" providerId="ADAL" clId="{37DC6012-C9E4-4526-AC9E-21302A4F6DEE}" dt="2020-07-29T16:53:24.359" v="71" actId="207"/>
+      <pc:chgData name="Jonathan Steel" userId="c59b30b6-b53b-4907-b963-706b6ac23b64" providerId="ADAL" clId="{37DC6012-C9E4-4526-AC9E-21302A4F6DEE}" dt="2020-08-08T09:59:41.414" v="108" actId="1076"/>
       <pc:docMkLst>
         <pc:docMk/>
       </pc:docMkLst>
       <pc:sldChg chg="addSp delSp modSp mod">
-        <pc:chgData name="Jonathan Steel" userId="c59b30b6-b53b-4907-b963-706b6ac23b64" providerId="ADAL" clId="{37DC6012-C9E4-4526-AC9E-21302A4F6DEE}" dt="2020-07-26T06:54:42.334" v="37" actId="21"/>
+        <pc:chgData name="Jonathan Steel" userId="c59b30b6-b53b-4907-b963-706b6ac23b64" providerId="ADAL" clId="{37DC6012-C9E4-4526-AC9E-21302A4F6DEE}" dt="2020-08-08T08:18:04.704" v="80" actId="21"/>
         <pc:sldMkLst>
           <pc:docMk/>
           <pc:sldMk cId="2066669287" sldId="256"/>
@@ -261,6 +263,14 @@
             <ac:grpSpMk id="15" creationId="{D9169543-CD61-44A2-BFBC-C4579157DA6A}"/>
           </ac:grpSpMkLst>
         </pc:grpChg>
+        <pc:picChg chg="add del mod">
+          <ac:chgData name="Jonathan Steel" userId="c59b30b6-b53b-4907-b963-706b6ac23b64" providerId="ADAL" clId="{37DC6012-C9E4-4526-AC9E-21302A4F6DEE}" dt="2020-08-08T08:18:04.704" v="80" actId="21"/>
+          <ac:picMkLst>
+            <pc:docMk/>
+            <pc:sldMk cId="2066669287" sldId="256"/>
+            <ac:picMk id="3" creationId="{CC28D25F-59F1-472D-AC33-D5B464CC6DD4}"/>
+          </ac:picMkLst>
+        </pc:picChg>
       </pc:sldChg>
       <pc:sldChg chg="del">
         <pc:chgData name="Jonathan Steel" userId="c59b30b6-b53b-4907-b963-706b6ac23b64" providerId="ADAL" clId="{37DC6012-C9E4-4526-AC9E-21302A4F6DEE}" dt="2020-07-25T13:57:32.281" v="0" actId="47"/>
@@ -439,6 +449,76 @@
           </ac:spMkLst>
         </pc:spChg>
       </pc:sldChg>
+      <pc:sldChg chg="addSp modSp add mod setBg">
+        <pc:chgData name="Jonathan Steel" userId="c59b30b6-b53b-4907-b963-706b6ac23b64" providerId="ADAL" clId="{37DC6012-C9E4-4526-AC9E-21302A4F6DEE}" dt="2020-08-08T08:18:27.171" v="85" actId="732"/>
+        <pc:sldMkLst>
+          <pc:docMk/>
+          <pc:sldMk cId="1527958744" sldId="267"/>
+        </pc:sldMkLst>
+        <pc:spChg chg="mod">
+          <ac:chgData name="Jonathan Steel" userId="c59b30b6-b53b-4907-b963-706b6ac23b64" providerId="ADAL" clId="{37DC6012-C9E4-4526-AC9E-21302A4F6DEE}" dt="2020-08-08T08:16:35.063" v="75" actId="207"/>
+          <ac:spMkLst>
+            <pc:docMk/>
+            <pc:sldMk cId="1527958744" sldId="267"/>
+            <ac:spMk id="6" creationId="{711BDB45-1330-4BA8-B68F-8317D3CE4070}"/>
+          </ac:spMkLst>
+        </pc:spChg>
+        <pc:spChg chg="mod">
+          <ac:chgData name="Jonathan Steel" userId="c59b30b6-b53b-4907-b963-706b6ac23b64" providerId="ADAL" clId="{37DC6012-C9E4-4526-AC9E-21302A4F6DEE}" dt="2020-08-08T08:16:26.229" v="73" actId="207"/>
+          <ac:spMkLst>
+            <pc:docMk/>
+            <pc:sldMk cId="1527958744" sldId="267"/>
+            <ac:spMk id="16" creationId="{D3B5FFC9-308B-4670-AF36-5F9EAC518B2D}"/>
+          </ac:spMkLst>
+        </pc:spChg>
+        <pc:spChg chg="mod">
+          <ac:chgData name="Jonathan Steel" userId="c59b30b6-b53b-4907-b963-706b6ac23b64" providerId="ADAL" clId="{37DC6012-C9E4-4526-AC9E-21302A4F6DEE}" dt="2020-08-08T08:16:29.405" v="74" actId="207"/>
+          <ac:spMkLst>
+            <pc:docMk/>
+            <pc:sldMk cId="1527958744" sldId="267"/>
+            <ac:spMk id="17" creationId="{81BEC71D-3D80-4C1D-AD6C-8D044C0FEDB8}"/>
+          </ac:spMkLst>
+        </pc:spChg>
+        <pc:picChg chg="add mod modCrop">
+          <ac:chgData name="Jonathan Steel" userId="c59b30b6-b53b-4907-b963-706b6ac23b64" providerId="ADAL" clId="{37DC6012-C9E4-4526-AC9E-21302A4F6DEE}" dt="2020-08-08T08:18:27.171" v="85" actId="732"/>
+          <ac:picMkLst>
+            <pc:docMk/>
+            <pc:sldMk cId="1527958744" sldId="267"/>
+            <ac:picMk id="3" creationId="{AAF419F8-F375-498D-A0BC-AEDA41A27065}"/>
+          </ac:picMkLst>
+        </pc:picChg>
+      </pc:sldChg>
+      <pc:sldChg chg="addSp modSp new mod ord setBg">
+        <pc:chgData name="Jonathan Steel" userId="c59b30b6-b53b-4907-b963-706b6ac23b64" providerId="ADAL" clId="{37DC6012-C9E4-4526-AC9E-21302A4F6DEE}" dt="2020-08-08T09:59:41.414" v="108" actId="1076"/>
+        <pc:sldMkLst>
+          <pc:docMk/>
+          <pc:sldMk cId="3794333621" sldId="268"/>
+        </pc:sldMkLst>
+        <pc:picChg chg="add mod">
+          <ac:chgData name="Jonathan Steel" userId="c59b30b6-b53b-4907-b963-706b6ac23b64" providerId="ADAL" clId="{37DC6012-C9E4-4526-AC9E-21302A4F6DEE}" dt="2020-08-08T09:58:57.271" v="104" actId="14100"/>
+          <ac:picMkLst>
+            <pc:docMk/>
+            <pc:sldMk cId="3794333621" sldId="268"/>
+            <ac:picMk id="3" creationId="{22EFD3FA-23DF-4845-BECE-67A7DF9BE3BE}"/>
+          </ac:picMkLst>
+        </pc:picChg>
+        <pc:picChg chg="add mod">
+          <ac:chgData name="Jonathan Steel" userId="c59b30b6-b53b-4907-b963-706b6ac23b64" providerId="ADAL" clId="{37DC6012-C9E4-4526-AC9E-21302A4F6DEE}" dt="2020-08-08T09:58:54.161" v="103" actId="14100"/>
+          <ac:picMkLst>
+            <pc:docMk/>
+            <pc:sldMk cId="3794333621" sldId="268"/>
+            <ac:picMk id="5" creationId="{CA41D45C-E5DE-4AEA-8B0B-FC50873C75B3}"/>
+          </ac:picMkLst>
+        </pc:picChg>
+        <pc:picChg chg="add mod">
+          <ac:chgData name="Jonathan Steel" userId="c59b30b6-b53b-4907-b963-706b6ac23b64" providerId="ADAL" clId="{37DC6012-C9E4-4526-AC9E-21302A4F6DEE}" dt="2020-08-08T09:59:41.414" v="108" actId="1076"/>
+          <ac:picMkLst>
+            <pc:docMk/>
+            <pc:sldMk cId="3794333621" sldId="268"/>
+            <ac:picMk id="7" creationId="{FC0B1ECB-69D9-4809-8142-DE3AFAE1A3FE}"/>
+          </ac:picMkLst>
+        </pc:picChg>
+      </pc:sldChg>
     </pc:docChg>
   </pc:docChgLst>
 </pc:chgInfo>
@@ -593,7 +673,7 @@
           <a:p>
             <a:fld id="{1058F848-1230-4DF9-87AA-86CE49EEA584}" type="datetimeFigureOut">
               <a:rPr lang="en-GB" smtClean="0"/>
-              <a:t>29/07/2020</a:t>
+              <a:t>08/08/2020</a:t>
             </a:fld>
             <a:endParaRPr lang="en-GB"/>
           </a:p>
@@ -793,7 +873,7 @@
           <a:p>
             <a:fld id="{1058F848-1230-4DF9-87AA-86CE49EEA584}" type="datetimeFigureOut">
               <a:rPr lang="en-GB" smtClean="0"/>
-              <a:t>29/07/2020</a:t>
+              <a:t>08/08/2020</a:t>
             </a:fld>
             <a:endParaRPr lang="en-GB"/>
           </a:p>
@@ -1003,7 +1083,7 @@
           <a:p>
             <a:fld id="{1058F848-1230-4DF9-87AA-86CE49EEA584}" type="datetimeFigureOut">
               <a:rPr lang="en-GB" smtClean="0"/>
-              <a:t>29/07/2020</a:t>
+              <a:t>08/08/2020</a:t>
             </a:fld>
             <a:endParaRPr lang="en-GB"/>
           </a:p>
@@ -1203,7 +1283,7 @@
           <a:p>
             <a:fld id="{1058F848-1230-4DF9-87AA-86CE49EEA584}" type="datetimeFigureOut">
               <a:rPr lang="en-GB" smtClean="0"/>
-              <a:t>29/07/2020</a:t>
+              <a:t>08/08/2020</a:t>
             </a:fld>
             <a:endParaRPr lang="en-GB"/>
           </a:p>
@@ -1479,7 +1559,7 @@
           <a:p>
             <a:fld id="{1058F848-1230-4DF9-87AA-86CE49EEA584}" type="datetimeFigureOut">
               <a:rPr lang="en-GB" smtClean="0"/>
-              <a:t>29/07/2020</a:t>
+              <a:t>08/08/2020</a:t>
             </a:fld>
             <a:endParaRPr lang="en-GB"/>
           </a:p>
@@ -1747,7 +1827,7 @@
           <a:p>
             <a:fld id="{1058F848-1230-4DF9-87AA-86CE49EEA584}" type="datetimeFigureOut">
               <a:rPr lang="en-GB" smtClean="0"/>
-              <a:t>29/07/2020</a:t>
+              <a:t>08/08/2020</a:t>
             </a:fld>
             <a:endParaRPr lang="en-GB"/>
           </a:p>
@@ -2162,7 +2242,7 @@
           <a:p>
             <a:fld id="{1058F848-1230-4DF9-87AA-86CE49EEA584}" type="datetimeFigureOut">
               <a:rPr lang="en-GB" smtClean="0"/>
-              <a:t>29/07/2020</a:t>
+              <a:t>08/08/2020</a:t>
             </a:fld>
             <a:endParaRPr lang="en-GB"/>
           </a:p>
@@ -2304,7 +2384,7 @@
           <a:p>
             <a:fld id="{1058F848-1230-4DF9-87AA-86CE49EEA584}" type="datetimeFigureOut">
               <a:rPr lang="en-GB" smtClean="0"/>
-              <a:t>29/07/2020</a:t>
+              <a:t>08/08/2020</a:t>
             </a:fld>
             <a:endParaRPr lang="en-GB"/>
           </a:p>
@@ -2417,7 +2497,7 @@
           <a:p>
             <a:fld id="{1058F848-1230-4DF9-87AA-86CE49EEA584}" type="datetimeFigureOut">
               <a:rPr lang="en-GB" smtClean="0"/>
-              <a:t>29/07/2020</a:t>
+              <a:t>08/08/2020</a:t>
             </a:fld>
             <a:endParaRPr lang="en-GB"/>
           </a:p>
@@ -2730,7 +2810,7 @@
           <a:p>
             <a:fld id="{1058F848-1230-4DF9-87AA-86CE49EEA584}" type="datetimeFigureOut">
               <a:rPr lang="en-GB" smtClean="0"/>
-              <a:t>29/07/2020</a:t>
+              <a:t>08/08/2020</a:t>
             </a:fld>
             <a:endParaRPr lang="en-GB"/>
           </a:p>
@@ -3019,7 +3099,7 @@
           <a:p>
             <a:fld id="{1058F848-1230-4DF9-87AA-86CE49EEA584}" type="datetimeFigureOut">
               <a:rPr lang="en-GB" smtClean="0"/>
-              <a:t>29/07/2020</a:t>
+              <a:t>08/08/2020</a:t>
             </a:fld>
             <a:endParaRPr lang="en-GB"/>
           </a:p>
@@ -3262,7 +3342,7 @@
           <a:p>
             <a:fld id="{1058F848-1230-4DF9-87AA-86CE49EEA584}" type="datetimeFigureOut">
               <a:rPr lang="en-GB" smtClean="0"/>
-              <a:t>29/07/2020</a:t>
+              <a:t>08/08/2020</a:t>
             </a:fld>
             <a:endParaRPr lang="en-GB"/>
           </a:p>
@@ -5055,6 +5135,85 @@
 </p:sld>
 </file>
 
+<file path=ppt/slides/slide10.xml><?xml version="1.0" encoding="utf-8"?>
+<p:sld xmlns:a="http://schemas.openxmlformats.org/drawingml/2006/main" xmlns:r="http://schemas.openxmlformats.org/officeDocument/2006/relationships" xmlns:p="http://schemas.openxmlformats.org/presentationml/2006/main">
+  <p:cSld>
+    <p:spTree>
+      <p:nvGrpSpPr>
+        <p:cNvPr id="1" name=""/>
+        <p:cNvGrpSpPr/>
+        <p:nvPr/>
+      </p:nvGrpSpPr>
+      <p:grpSpPr>
+        <a:xfrm>
+          <a:off x="0" y="0"/>
+          <a:ext cx="0" cy="0"/>
+          <a:chOff x="0" y="0"/>
+          <a:chExt cx="0" cy="0"/>
+        </a:xfrm>
+      </p:grpSpPr>
+      <p:sp>
+        <p:nvSpPr>
+          <p:cNvPr id="5" name="Rectangle 4">
+            <a:extLst>
+              <a:ext uri="{FF2B5EF4-FFF2-40B4-BE49-F238E27FC236}">
+                <a16:creationId xmlns:a16="http://schemas.microsoft.com/office/drawing/2014/main" id="{2E5719A5-53CC-4C02-B198-2F57B06F8181}"/>
+              </a:ext>
+            </a:extLst>
+          </p:cNvPr>
+          <p:cNvSpPr/>
+          <p:nvPr/>
+        </p:nvSpPr>
+        <p:spPr>
+          <a:xfrm>
+            <a:off x="0" y="0"/>
+            <a:ext cx="4234649" cy="6858000"/>
+          </a:xfrm>
+          <a:prstGeom prst="rect">
+            <a:avLst/>
+          </a:prstGeom>
+          <a:solidFill>
+            <a:srgbClr val="00B0F0"/>
+          </a:solidFill>
+        </p:spPr>
+        <p:style>
+          <a:lnRef idx="2">
+            <a:schemeClr val="accent1">
+              <a:shade val="50000"/>
+            </a:schemeClr>
+          </a:lnRef>
+          <a:fillRef idx="1">
+            <a:schemeClr val="accent1"/>
+          </a:fillRef>
+          <a:effectRef idx="0">
+            <a:schemeClr val="accent1"/>
+          </a:effectRef>
+          <a:fontRef idx="minor">
+            <a:schemeClr val="lt1"/>
+          </a:fontRef>
+        </p:style>
+        <p:txBody>
+          <a:bodyPr rtlCol="0" anchor="ctr"/>
+          <a:lstStyle/>
+          <a:p>
+            <a:pPr algn="ctr"/>
+            <a:endParaRPr lang="en-GB"/>
+          </a:p>
+        </p:txBody>
+      </p:sp>
+    </p:spTree>
+    <p:extLst>
+      <p:ext uri="{BB962C8B-B14F-4D97-AF65-F5344CB8AC3E}">
+        <p14:creationId xmlns:p14="http://schemas.microsoft.com/office/powerpoint/2010/main" val="4014324031"/>
+      </p:ext>
+    </p:extLst>
+  </p:cSld>
+  <p:clrMapOvr>
+    <a:masterClrMapping/>
+  </p:clrMapOvr>
+</p:sld>
+</file>
+
 <file path=ppt/slides/slide2.xml><?xml version="1.0" encoding="utf-8"?>
 <p:sld xmlns:a="http://schemas.openxmlformats.org/drawingml/2006/main" xmlns:r="http://schemas.openxmlformats.org/officeDocument/2006/relationships" xmlns:p="http://schemas.openxmlformats.org/presentationml/2006/main">
   <p:cSld>
@@ -9165,6 +9324,1407 @@
 <file path=ppt/slides/slide5.xml><?xml version="1.0" encoding="utf-8"?>
 <p:sld xmlns:a="http://schemas.openxmlformats.org/drawingml/2006/main" xmlns:r="http://schemas.openxmlformats.org/officeDocument/2006/relationships" xmlns:p="http://schemas.openxmlformats.org/presentationml/2006/main">
   <p:cSld>
+    <p:bg>
+      <p:bgPr>
+        <a:solidFill>
+          <a:schemeClr val="tx1"/>
+        </a:solidFill>
+        <a:effectLst/>
+      </p:bgPr>
+    </p:bg>
+    <p:spTree>
+      <p:nvGrpSpPr>
+        <p:cNvPr id="1" name=""/>
+        <p:cNvGrpSpPr/>
+        <p:nvPr/>
+      </p:nvGrpSpPr>
+      <p:grpSpPr>
+        <a:xfrm>
+          <a:off x="0" y="0"/>
+          <a:ext cx="0" cy="0"/>
+          <a:chOff x="0" y="0"/>
+          <a:chExt cx="0" cy="0"/>
+        </a:xfrm>
+      </p:grpSpPr>
+      <p:grpSp>
+        <p:nvGrpSpPr>
+          <p:cNvPr id="10" name="Graphic 4">
+            <a:extLst>
+              <a:ext uri="{FF2B5EF4-FFF2-40B4-BE49-F238E27FC236}">
+                <a16:creationId xmlns:a16="http://schemas.microsoft.com/office/drawing/2014/main" id="{D9169543-CD61-44A2-BFBC-C4579157DA6A}"/>
+              </a:ext>
+            </a:extLst>
+          </p:cNvPr>
+          <p:cNvGrpSpPr/>
+          <p:nvPr/>
+        </p:nvGrpSpPr>
+        <p:grpSpPr>
+          <a:xfrm>
+            <a:off x="257265814" y="117609354"/>
+            <a:ext cx="1159379" cy="1573304"/>
+            <a:chOff x="257921596" y="118181929"/>
+            <a:chExt cx="1159379" cy="1573304"/>
+          </a:xfrm>
+          <a:gradFill flip="none" rotWithShape="1">
+            <a:gsLst>
+              <a:gs pos="0">
+                <a:srgbClr val="0998DC"/>
+              </a:gs>
+              <a:gs pos="100000">
+                <a:srgbClr val="2D388A"/>
+              </a:gs>
+            </a:gsLst>
+            <a:lin ang="10800000" scaled="1"/>
+            <a:tileRect/>
+          </a:gradFill>
+        </p:grpSpPr>
+        <p:sp>
+          <p:nvSpPr>
+            <p:cNvPr id="11" name="Freeform: Shape 10">
+              <a:extLst>
+                <a:ext uri="{FF2B5EF4-FFF2-40B4-BE49-F238E27FC236}">
+                  <a16:creationId xmlns:a16="http://schemas.microsoft.com/office/drawing/2014/main" id="{DE402350-76CF-477E-8F1D-884F932902C4}"/>
+                </a:ext>
+              </a:extLst>
+            </p:cNvPr>
+            <p:cNvSpPr/>
+            <p:nvPr/>
+          </p:nvSpPr>
+          <p:spPr>
+            <a:xfrm>
+              <a:off x="257921596" y="118181929"/>
+              <a:ext cx="949077" cy="1219059"/>
+            </a:xfrm>
+            <a:custGeom>
+              <a:avLst/>
+              <a:gdLst>
+                <a:gd name="connsiteX0" fmla="*/ 949078 w 949077"/>
+                <a:gd name="connsiteY0" fmla="*/ 293527 h 1219059"/>
+                <a:gd name="connsiteX1" fmla="*/ 949078 w 949077"/>
+                <a:gd name="connsiteY1" fmla="*/ 195684 h 1219059"/>
+                <a:gd name="connsiteX2" fmla="*/ 474527 w 949077"/>
+                <a:gd name="connsiteY2" fmla="*/ 0 h 1219059"/>
+                <a:gd name="connsiteX3" fmla="*/ 0 w 949077"/>
+                <a:gd name="connsiteY3" fmla="*/ 195684 h 1219059"/>
+                <a:gd name="connsiteX4" fmla="*/ 0 w 949077"/>
+                <a:gd name="connsiteY4" fmla="*/ 293527 h 1219059"/>
+                <a:gd name="connsiteX5" fmla="*/ 97844 w 949077"/>
+                <a:gd name="connsiteY5" fmla="*/ 533235 h 1219059"/>
+                <a:gd name="connsiteX6" fmla="*/ 342452 w 949077"/>
+                <a:gd name="connsiteY6" fmla="*/ 772944 h 1219059"/>
+                <a:gd name="connsiteX7" fmla="*/ 362016 w 949077"/>
+                <a:gd name="connsiteY7" fmla="*/ 821865 h 1219059"/>
+                <a:gd name="connsiteX8" fmla="*/ 362016 w 949077"/>
+                <a:gd name="connsiteY8" fmla="*/ 1134968 h 1219059"/>
+                <a:gd name="connsiteX9" fmla="*/ 391374 w 949077"/>
+                <a:gd name="connsiteY9" fmla="*/ 1174107 h 1219059"/>
+                <a:gd name="connsiteX10" fmla="*/ 533243 w 949077"/>
+                <a:gd name="connsiteY10" fmla="*/ 1218131 h 1219059"/>
+                <a:gd name="connsiteX11" fmla="*/ 582164 w 949077"/>
+                <a:gd name="connsiteY11" fmla="*/ 1178992 h 1219059"/>
+                <a:gd name="connsiteX12" fmla="*/ 582164 w 949077"/>
+                <a:gd name="connsiteY12" fmla="*/ 826762 h 1219059"/>
+                <a:gd name="connsiteX13" fmla="*/ 601728 w 949077"/>
+                <a:gd name="connsiteY13" fmla="*/ 777841 h 1219059"/>
+                <a:gd name="connsiteX14" fmla="*/ 851234 w 949077"/>
+                <a:gd name="connsiteY14" fmla="*/ 533235 h 1219059"/>
+                <a:gd name="connsiteX15" fmla="*/ 949078 w 949077"/>
+                <a:gd name="connsiteY15" fmla="*/ 293527 h 1219059"/>
+                <a:gd name="connsiteX16" fmla="*/ 474527 w 949077"/>
+                <a:gd name="connsiteY16" fmla="*/ 288630 h 1219059"/>
+                <a:gd name="connsiteX17" fmla="*/ 107614 w 949077"/>
+                <a:gd name="connsiteY17" fmla="*/ 200569 h 1219059"/>
+                <a:gd name="connsiteX18" fmla="*/ 107614 w 949077"/>
+                <a:gd name="connsiteY18" fmla="*/ 200569 h 1219059"/>
+                <a:gd name="connsiteX19" fmla="*/ 474527 w 949077"/>
+                <a:gd name="connsiteY19" fmla="*/ 112509 h 1219059"/>
+                <a:gd name="connsiteX20" fmla="*/ 841440 w 949077"/>
+                <a:gd name="connsiteY20" fmla="*/ 200569 h 1219059"/>
+                <a:gd name="connsiteX21" fmla="*/ 474527 w 949077"/>
+                <a:gd name="connsiteY21" fmla="*/ 288630 h 1219059"/>
+              </a:gdLst>
+              <a:ahLst/>
+              <a:cxnLst>
+                <a:cxn ang="0">
+                  <a:pos x="connsiteX0" y="connsiteY0"/>
+                </a:cxn>
+                <a:cxn ang="0">
+                  <a:pos x="connsiteX1" y="connsiteY1"/>
+                </a:cxn>
+                <a:cxn ang="0">
+                  <a:pos x="connsiteX2" y="connsiteY2"/>
+                </a:cxn>
+                <a:cxn ang="0">
+                  <a:pos x="connsiteX3" y="connsiteY3"/>
+                </a:cxn>
+                <a:cxn ang="0">
+                  <a:pos x="connsiteX4" y="connsiteY4"/>
+                </a:cxn>
+                <a:cxn ang="0">
+                  <a:pos x="connsiteX5" y="connsiteY5"/>
+                </a:cxn>
+                <a:cxn ang="0">
+                  <a:pos x="connsiteX6" y="connsiteY6"/>
+                </a:cxn>
+                <a:cxn ang="0">
+                  <a:pos x="connsiteX7" y="connsiteY7"/>
+                </a:cxn>
+                <a:cxn ang="0">
+                  <a:pos x="connsiteX8" y="connsiteY8"/>
+                </a:cxn>
+                <a:cxn ang="0">
+                  <a:pos x="connsiteX9" y="connsiteY9"/>
+                </a:cxn>
+                <a:cxn ang="0">
+                  <a:pos x="connsiteX10" y="connsiteY10"/>
+                </a:cxn>
+                <a:cxn ang="0">
+                  <a:pos x="connsiteX11" y="connsiteY11"/>
+                </a:cxn>
+                <a:cxn ang="0">
+                  <a:pos x="connsiteX12" y="connsiteY12"/>
+                </a:cxn>
+                <a:cxn ang="0">
+                  <a:pos x="connsiteX13" y="connsiteY13"/>
+                </a:cxn>
+                <a:cxn ang="0">
+                  <a:pos x="connsiteX14" y="connsiteY14"/>
+                </a:cxn>
+                <a:cxn ang="0">
+                  <a:pos x="connsiteX15" y="connsiteY15"/>
+                </a:cxn>
+                <a:cxn ang="0">
+                  <a:pos x="connsiteX16" y="connsiteY16"/>
+                </a:cxn>
+                <a:cxn ang="0">
+                  <a:pos x="connsiteX17" y="connsiteY17"/>
+                </a:cxn>
+                <a:cxn ang="0">
+                  <a:pos x="connsiteX18" y="connsiteY18"/>
+                </a:cxn>
+                <a:cxn ang="0">
+                  <a:pos x="connsiteX19" y="connsiteY19"/>
+                </a:cxn>
+                <a:cxn ang="0">
+                  <a:pos x="connsiteX20" y="connsiteY20"/>
+                </a:cxn>
+                <a:cxn ang="0">
+                  <a:pos x="connsiteX21" y="connsiteY21"/>
+                </a:cxn>
+              </a:cxnLst>
+              <a:rect l="l" t="t" r="r" b="b"/>
+              <a:pathLst>
+                <a:path w="949077" h="1219059">
+                  <a:moveTo>
+                    <a:pt x="949078" y="293527"/>
+                  </a:moveTo>
+                  <a:lnTo>
+                    <a:pt x="949078" y="195684"/>
+                  </a:lnTo>
+                  <a:cubicBezTo>
+                    <a:pt x="949078" y="58703"/>
+                    <a:pt x="704469" y="0"/>
+                    <a:pt x="474527" y="0"/>
+                  </a:cubicBezTo>
+                  <a:cubicBezTo>
+                    <a:pt x="244609" y="0"/>
+                    <a:pt x="0" y="63588"/>
+                    <a:pt x="0" y="195684"/>
+                  </a:cubicBezTo>
+                  <a:lnTo>
+                    <a:pt x="0" y="293527"/>
+                  </a:lnTo>
+                  <a:cubicBezTo>
+                    <a:pt x="0" y="381575"/>
+                    <a:pt x="34231" y="469636"/>
+                    <a:pt x="97844" y="533235"/>
+                  </a:cubicBezTo>
+                  <a:lnTo>
+                    <a:pt x="342452" y="772944"/>
+                  </a:lnTo>
+                  <a:cubicBezTo>
+                    <a:pt x="357119" y="787623"/>
+                    <a:pt x="362016" y="802302"/>
+                    <a:pt x="362016" y="821865"/>
+                  </a:cubicBezTo>
+                  <a:lnTo>
+                    <a:pt x="362016" y="1134968"/>
+                  </a:lnTo>
+                  <a:cubicBezTo>
+                    <a:pt x="362016" y="1154531"/>
+                    <a:pt x="371786" y="1169210"/>
+                    <a:pt x="391374" y="1174107"/>
+                  </a:cubicBezTo>
+                  <a:lnTo>
+                    <a:pt x="533243" y="1218131"/>
+                  </a:lnTo>
+                  <a:cubicBezTo>
+                    <a:pt x="557704" y="1223028"/>
+                    <a:pt x="582164" y="1208349"/>
+                    <a:pt x="582164" y="1178992"/>
+                  </a:cubicBezTo>
+                  <a:lnTo>
+                    <a:pt x="582164" y="826762"/>
+                  </a:lnTo>
+                  <a:cubicBezTo>
+                    <a:pt x="582164" y="807198"/>
+                    <a:pt x="591934" y="792520"/>
+                    <a:pt x="601728" y="777841"/>
+                  </a:cubicBezTo>
+                  <a:lnTo>
+                    <a:pt x="851234" y="533235"/>
+                  </a:lnTo>
+                  <a:cubicBezTo>
+                    <a:pt x="914823" y="469636"/>
+                    <a:pt x="949078" y="381575"/>
+                    <a:pt x="949078" y="293527"/>
+                  </a:cubicBezTo>
+                  <a:close/>
+                  <a:moveTo>
+                    <a:pt x="474527" y="288630"/>
+                  </a:moveTo>
+                  <a:cubicBezTo>
+                    <a:pt x="239712" y="288630"/>
+                    <a:pt x="112511" y="225030"/>
+                    <a:pt x="107614" y="200569"/>
+                  </a:cubicBezTo>
+                  <a:lnTo>
+                    <a:pt x="107614" y="200569"/>
+                  </a:lnTo>
+                  <a:cubicBezTo>
+                    <a:pt x="112511" y="176109"/>
+                    <a:pt x="239712" y="112509"/>
+                    <a:pt x="474527" y="112509"/>
+                  </a:cubicBezTo>
+                  <a:cubicBezTo>
+                    <a:pt x="709366" y="112509"/>
+                    <a:pt x="831670" y="176109"/>
+                    <a:pt x="841440" y="200569"/>
+                  </a:cubicBezTo>
+                  <a:cubicBezTo>
+                    <a:pt x="831670" y="225030"/>
+                    <a:pt x="709366" y="288630"/>
+                    <a:pt x="474527" y="288630"/>
+                  </a:cubicBezTo>
+                  <a:close/>
+                </a:path>
+              </a:pathLst>
+            </a:custGeom>
+            <a:grpFill/>
+            <a:ln w="41243" cap="flat">
+              <a:noFill/>
+              <a:prstDash val="solid"/>
+              <a:miter/>
+            </a:ln>
+          </p:spPr>
+          <p:txBody>
+            <a:bodyPr rtlCol="0" anchor="ctr"/>
+            <a:lstStyle/>
+            <a:p>
+              <a:endParaRPr lang="en-GB"/>
+            </a:p>
+          </p:txBody>
+        </p:sp>
+        <p:sp>
+          <p:nvSpPr>
+            <p:cNvPr id="12" name="Freeform: Shape 11">
+              <a:extLst>
+                <a:ext uri="{FF2B5EF4-FFF2-40B4-BE49-F238E27FC236}">
+                  <a16:creationId xmlns:a16="http://schemas.microsoft.com/office/drawing/2014/main" id="{E25B6E33-FC74-45C3-A157-FCB46E474204}"/>
+                </a:ext>
+              </a:extLst>
+            </p:cNvPr>
+            <p:cNvSpPr/>
+            <p:nvPr/>
+          </p:nvSpPr>
+          <p:spPr>
+            <a:xfrm>
+              <a:off x="258591810" y="118974448"/>
+              <a:ext cx="308221" cy="97842"/>
+            </a:xfrm>
+            <a:custGeom>
+              <a:avLst/>
+              <a:gdLst>
+                <a:gd name="connsiteX0" fmla="*/ 48922 w 308221"/>
+                <a:gd name="connsiteY0" fmla="*/ 0 h 97842"/>
+                <a:gd name="connsiteX1" fmla="*/ 0 w 308221"/>
+                <a:gd name="connsiteY1" fmla="*/ 48921 h 97842"/>
+                <a:gd name="connsiteX2" fmla="*/ 48922 w 308221"/>
+                <a:gd name="connsiteY2" fmla="*/ 97842 h 97842"/>
+                <a:gd name="connsiteX3" fmla="*/ 259300 w 308221"/>
+                <a:gd name="connsiteY3" fmla="*/ 97842 h 97842"/>
+                <a:gd name="connsiteX4" fmla="*/ 308222 w 308221"/>
+                <a:gd name="connsiteY4" fmla="*/ 48921 h 97842"/>
+                <a:gd name="connsiteX5" fmla="*/ 259300 w 308221"/>
+                <a:gd name="connsiteY5" fmla="*/ 0 h 97842"/>
+                <a:gd name="connsiteX6" fmla="*/ 48922 w 308221"/>
+                <a:gd name="connsiteY6" fmla="*/ 0 h 97842"/>
+              </a:gdLst>
+              <a:ahLst/>
+              <a:cxnLst>
+                <a:cxn ang="0">
+                  <a:pos x="connsiteX0" y="connsiteY0"/>
+                </a:cxn>
+                <a:cxn ang="0">
+                  <a:pos x="connsiteX1" y="connsiteY1"/>
+                </a:cxn>
+                <a:cxn ang="0">
+                  <a:pos x="connsiteX2" y="connsiteY2"/>
+                </a:cxn>
+                <a:cxn ang="0">
+                  <a:pos x="connsiteX3" y="connsiteY3"/>
+                </a:cxn>
+                <a:cxn ang="0">
+                  <a:pos x="connsiteX4" y="connsiteY4"/>
+                </a:cxn>
+                <a:cxn ang="0">
+                  <a:pos x="connsiteX5" y="connsiteY5"/>
+                </a:cxn>
+                <a:cxn ang="0">
+                  <a:pos x="connsiteX6" y="connsiteY6"/>
+                </a:cxn>
+              </a:cxnLst>
+              <a:rect l="l" t="t" r="r" b="b"/>
+              <a:pathLst>
+                <a:path w="308221" h="97842">
+                  <a:moveTo>
+                    <a:pt x="48922" y="0"/>
+                  </a:moveTo>
+                  <a:cubicBezTo>
+                    <a:pt x="19564" y="0"/>
+                    <a:pt x="0" y="19564"/>
+                    <a:pt x="0" y="48921"/>
+                  </a:cubicBezTo>
+                  <a:cubicBezTo>
+                    <a:pt x="0" y="78267"/>
+                    <a:pt x="19564" y="97842"/>
+                    <a:pt x="48922" y="97842"/>
+                  </a:cubicBezTo>
+                  <a:lnTo>
+                    <a:pt x="259300" y="97842"/>
+                  </a:lnTo>
+                  <a:cubicBezTo>
+                    <a:pt x="288634" y="97842"/>
+                    <a:pt x="308222" y="78267"/>
+                    <a:pt x="308222" y="48921"/>
+                  </a:cubicBezTo>
+                  <a:cubicBezTo>
+                    <a:pt x="308222" y="19564"/>
+                    <a:pt x="288634" y="0"/>
+                    <a:pt x="259300" y="0"/>
+                  </a:cubicBezTo>
+                  <a:lnTo>
+                    <a:pt x="48922" y="0"/>
+                  </a:lnTo>
+                  <a:close/>
+                </a:path>
+              </a:pathLst>
+            </a:custGeom>
+            <a:grpFill/>
+            <a:ln w="41243" cap="flat">
+              <a:noFill/>
+              <a:prstDash val="solid"/>
+              <a:miter/>
+            </a:ln>
+          </p:spPr>
+          <p:txBody>
+            <a:bodyPr rtlCol="0" anchor="ctr"/>
+            <a:lstStyle/>
+            <a:p>
+              <a:endParaRPr lang="en-GB"/>
+            </a:p>
+          </p:txBody>
+        </p:sp>
+        <p:sp>
+          <p:nvSpPr>
+            <p:cNvPr id="13" name="Freeform: Shape 12">
+              <a:extLst>
+                <a:ext uri="{FF2B5EF4-FFF2-40B4-BE49-F238E27FC236}">
+                  <a16:creationId xmlns:a16="http://schemas.microsoft.com/office/drawing/2014/main" id="{385FBF46-F998-4FFC-880B-7122E39E2DB2}"/>
+                </a:ext>
+              </a:extLst>
+            </p:cNvPr>
+            <p:cNvSpPr/>
+            <p:nvPr/>
+          </p:nvSpPr>
+          <p:spPr>
+            <a:xfrm>
+              <a:off x="258591810" y="119140776"/>
+              <a:ext cx="308221" cy="97842"/>
+            </a:xfrm>
+            <a:custGeom>
+              <a:avLst/>
+              <a:gdLst>
+                <a:gd name="connsiteX0" fmla="*/ 259300 w 308221"/>
+                <a:gd name="connsiteY0" fmla="*/ 0 h 97842"/>
+                <a:gd name="connsiteX1" fmla="*/ 48922 w 308221"/>
+                <a:gd name="connsiteY1" fmla="*/ 0 h 97842"/>
+                <a:gd name="connsiteX2" fmla="*/ 0 w 308221"/>
+                <a:gd name="connsiteY2" fmla="*/ 48921 h 97842"/>
+                <a:gd name="connsiteX3" fmla="*/ 48922 w 308221"/>
+                <a:gd name="connsiteY3" fmla="*/ 97842 h 97842"/>
+                <a:gd name="connsiteX4" fmla="*/ 259300 w 308221"/>
+                <a:gd name="connsiteY4" fmla="*/ 97842 h 97842"/>
+                <a:gd name="connsiteX5" fmla="*/ 308222 w 308221"/>
+                <a:gd name="connsiteY5" fmla="*/ 48921 h 97842"/>
+                <a:gd name="connsiteX6" fmla="*/ 259300 w 308221"/>
+                <a:gd name="connsiteY6" fmla="*/ 0 h 97842"/>
+              </a:gdLst>
+              <a:ahLst/>
+              <a:cxnLst>
+                <a:cxn ang="0">
+                  <a:pos x="connsiteX0" y="connsiteY0"/>
+                </a:cxn>
+                <a:cxn ang="0">
+                  <a:pos x="connsiteX1" y="connsiteY1"/>
+                </a:cxn>
+                <a:cxn ang="0">
+                  <a:pos x="connsiteX2" y="connsiteY2"/>
+                </a:cxn>
+                <a:cxn ang="0">
+                  <a:pos x="connsiteX3" y="connsiteY3"/>
+                </a:cxn>
+                <a:cxn ang="0">
+                  <a:pos x="connsiteX4" y="connsiteY4"/>
+                </a:cxn>
+                <a:cxn ang="0">
+                  <a:pos x="connsiteX5" y="connsiteY5"/>
+                </a:cxn>
+                <a:cxn ang="0">
+                  <a:pos x="connsiteX6" y="connsiteY6"/>
+                </a:cxn>
+              </a:cxnLst>
+              <a:rect l="l" t="t" r="r" b="b"/>
+              <a:pathLst>
+                <a:path w="308221" h="97842">
+                  <a:moveTo>
+                    <a:pt x="259300" y="0"/>
+                  </a:moveTo>
+                  <a:lnTo>
+                    <a:pt x="48922" y="0"/>
+                  </a:lnTo>
+                  <a:cubicBezTo>
+                    <a:pt x="19564" y="0"/>
+                    <a:pt x="0" y="19576"/>
+                    <a:pt x="0" y="48921"/>
+                  </a:cubicBezTo>
+                  <a:cubicBezTo>
+                    <a:pt x="0" y="78279"/>
+                    <a:pt x="19564" y="97842"/>
+                    <a:pt x="48922" y="97842"/>
+                  </a:cubicBezTo>
+                  <a:lnTo>
+                    <a:pt x="259300" y="97842"/>
+                  </a:lnTo>
+                  <a:cubicBezTo>
+                    <a:pt x="288634" y="97842"/>
+                    <a:pt x="308222" y="78279"/>
+                    <a:pt x="308222" y="48921"/>
+                  </a:cubicBezTo>
+                  <a:cubicBezTo>
+                    <a:pt x="308222" y="19576"/>
+                    <a:pt x="288634" y="0"/>
+                    <a:pt x="259300" y="0"/>
+                  </a:cubicBezTo>
+                  <a:close/>
+                </a:path>
+              </a:pathLst>
+            </a:custGeom>
+            <a:grpFill/>
+            <a:ln w="41243" cap="flat">
+              <a:noFill/>
+              <a:prstDash val="solid"/>
+              <a:miter/>
+            </a:ln>
+          </p:spPr>
+          <p:txBody>
+            <a:bodyPr rtlCol="0" anchor="ctr"/>
+            <a:lstStyle/>
+            <a:p>
+              <a:endParaRPr lang="en-GB"/>
+            </a:p>
+          </p:txBody>
+        </p:sp>
+        <p:sp>
+          <p:nvSpPr>
+            <p:cNvPr id="14" name="Freeform: Shape 13">
+              <a:extLst>
+                <a:ext uri="{FF2B5EF4-FFF2-40B4-BE49-F238E27FC236}">
+                  <a16:creationId xmlns:a16="http://schemas.microsoft.com/office/drawing/2014/main" id="{85BDE427-1CAC-4737-B09E-8D6BE2B8506F}"/>
+                </a:ext>
+              </a:extLst>
+            </p:cNvPr>
+            <p:cNvSpPr/>
+            <p:nvPr/>
+          </p:nvSpPr>
+          <p:spPr>
+            <a:xfrm>
+              <a:off x="258591810" y="119302218"/>
+              <a:ext cx="308221" cy="97842"/>
+            </a:xfrm>
+            <a:custGeom>
+              <a:avLst/>
+              <a:gdLst>
+                <a:gd name="connsiteX0" fmla="*/ 259300 w 308221"/>
+                <a:gd name="connsiteY0" fmla="*/ 0 h 97842"/>
+                <a:gd name="connsiteX1" fmla="*/ 48922 w 308221"/>
+                <a:gd name="connsiteY1" fmla="*/ 0 h 97842"/>
+                <a:gd name="connsiteX2" fmla="*/ 0 w 308221"/>
+                <a:gd name="connsiteY2" fmla="*/ 48921 h 97842"/>
+                <a:gd name="connsiteX3" fmla="*/ 48922 w 308221"/>
+                <a:gd name="connsiteY3" fmla="*/ 97842 h 97842"/>
+                <a:gd name="connsiteX4" fmla="*/ 259300 w 308221"/>
+                <a:gd name="connsiteY4" fmla="*/ 97842 h 97842"/>
+                <a:gd name="connsiteX5" fmla="*/ 308222 w 308221"/>
+                <a:gd name="connsiteY5" fmla="*/ 48921 h 97842"/>
+                <a:gd name="connsiteX6" fmla="*/ 259300 w 308221"/>
+                <a:gd name="connsiteY6" fmla="*/ 0 h 97842"/>
+              </a:gdLst>
+              <a:ahLst/>
+              <a:cxnLst>
+                <a:cxn ang="0">
+                  <a:pos x="connsiteX0" y="connsiteY0"/>
+                </a:cxn>
+                <a:cxn ang="0">
+                  <a:pos x="connsiteX1" y="connsiteY1"/>
+                </a:cxn>
+                <a:cxn ang="0">
+                  <a:pos x="connsiteX2" y="connsiteY2"/>
+                </a:cxn>
+                <a:cxn ang="0">
+                  <a:pos x="connsiteX3" y="connsiteY3"/>
+                </a:cxn>
+                <a:cxn ang="0">
+                  <a:pos x="connsiteX4" y="connsiteY4"/>
+                </a:cxn>
+                <a:cxn ang="0">
+                  <a:pos x="connsiteX5" y="connsiteY5"/>
+                </a:cxn>
+                <a:cxn ang="0">
+                  <a:pos x="connsiteX6" y="connsiteY6"/>
+                </a:cxn>
+              </a:cxnLst>
+              <a:rect l="l" t="t" r="r" b="b"/>
+              <a:pathLst>
+                <a:path w="308221" h="97842">
+                  <a:moveTo>
+                    <a:pt x="259300" y="0"/>
+                  </a:moveTo>
+                  <a:lnTo>
+                    <a:pt x="48922" y="0"/>
+                  </a:lnTo>
+                  <a:cubicBezTo>
+                    <a:pt x="19564" y="0"/>
+                    <a:pt x="0" y="19564"/>
+                    <a:pt x="0" y="48921"/>
+                  </a:cubicBezTo>
+                  <a:cubicBezTo>
+                    <a:pt x="0" y="78279"/>
+                    <a:pt x="19564" y="97842"/>
+                    <a:pt x="48922" y="97842"/>
+                  </a:cubicBezTo>
+                  <a:lnTo>
+                    <a:pt x="259300" y="97842"/>
+                  </a:lnTo>
+                  <a:cubicBezTo>
+                    <a:pt x="288634" y="97842"/>
+                    <a:pt x="308222" y="78279"/>
+                    <a:pt x="308222" y="48921"/>
+                  </a:cubicBezTo>
+                  <a:cubicBezTo>
+                    <a:pt x="308222" y="24461"/>
+                    <a:pt x="288634" y="0"/>
+                    <a:pt x="259300" y="0"/>
+                  </a:cubicBezTo>
+                  <a:close/>
+                </a:path>
+              </a:pathLst>
+            </a:custGeom>
+            <a:grpFill/>
+            <a:ln w="41243" cap="flat">
+              <a:noFill/>
+              <a:prstDash val="solid"/>
+              <a:miter/>
+            </a:ln>
+          </p:spPr>
+          <p:txBody>
+            <a:bodyPr rtlCol="0" anchor="ctr"/>
+            <a:lstStyle/>
+            <a:p>
+              <a:endParaRPr lang="en-GB"/>
+            </a:p>
+          </p:txBody>
+        </p:sp>
+      </p:grpSp>
+      <p:grpSp>
+        <p:nvGrpSpPr>
+          <p:cNvPr id="2" name="Group 1">
+            <a:extLst>
+              <a:ext uri="{FF2B5EF4-FFF2-40B4-BE49-F238E27FC236}">
+                <a16:creationId xmlns:a16="http://schemas.microsoft.com/office/drawing/2014/main" id="{3F68088C-3147-48FA-868F-D9321D46D4FF}"/>
+              </a:ext>
+            </a:extLst>
+          </p:cNvPr>
+          <p:cNvGrpSpPr/>
+          <p:nvPr/>
+        </p:nvGrpSpPr>
+        <p:grpSpPr>
+          <a:xfrm>
+            <a:off x="379453" y="1888246"/>
+            <a:ext cx="12209711" cy="2646878"/>
+            <a:chOff x="379453" y="1888246"/>
+            <a:chExt cx="12209711" cy="2646878"/>
+          </a:xfrm>
+        </p:grpSpPr>
+        <p:sp>
+          <p:nvSpPr>
+            <p:cNvPr id="6" name="TextBox 5">
+              <a:extLst>
+                <a:ext uri="{FF2B5EF4-FFF2-40B4-BE49-F238E27FC236}">
+                  <a16:creationId xmlns:a16="http://schemas.microsoft.com/office/drawing/2014/main" id="{711BDB45-1330-4BA8-B68F-8317D3CE4070}"/>
+                </a:ext>
+              </a:extLst>
+            </p:cNvPr>
+            <p:cNvSpPr txBox="1"/>
+            <p:nvPr/>
+          </p:nvSpPr>
+          <p:spPr>
+            <a:xfrm>
+              <a:off x="2485555" y="1888246"/>
+              <a:ext cx="10103609" cy="2646878"/>
+            </a:xfrm>
+            <a:prstGeom prst="rect">
+              <a:avLst/>
+            </a:prstGeom>
+            <a:noFill/>
+          </p:spPr>
+          <p:txBody>
+            <a:bodyPr wrap="square" rtlCol="0">
+              <a:spAutoFit/>
+            </a:bodyPr>
+            <a:lstStyle/>
+            <a:p>
+              <a:r>
+                <a:rPr lang="en-GB" sz="16600" b="1" dirty="0">
+                  <a:solidFill>
+                    <a:schemeClr val="bg1"/>
+                  </a:solidFill>
+                  <a:latin typeface="Open Sans" panose="020B0606030504020204" pitchFamily="34" charset="0"/>
+                  <a:ea typeface="Open Sans" panose="020B0606030504020204" pitchFamily="34" charset="0"/>
+                  <a:cs typeface="Open Sans" panose="020B0606030504020204" pitchFamily="34" charset="0"/>
+                </a:rPr>
+                <a:t>Recuerda</a:t>
+              </a:r>
+              <a:endParaRPr lang="en-GB" sz="11500" b="1" dirty="0">
+                <a:solidFill>
+                  <a:schemeClr val="bg1"/>
+                </a:solidFill>
+                <a:latin typeface="Open Sans" panose="020B0606030504020204" pitchFamily="34" charset="0"/>
+                <a:ea typeface="Open Sans" panose="020B0606030504020204" pitchFamily="34" charset="0"/>
+                <a:cs typeface="Open Sans" panose="020B0606030504020204" pitchFamily="34" charset="0"/>
+              </a:endParaRPr>
+            </a:p>
+          </p:txBody>
+        </p:sp>
+        <p:grpSp>
+          <p:nvGrpSpPr>
+            <p:cNvPr id="15" name="Graphic 4">
+              <a:extLst>
+                <a:ext uri="{FF2B5EF4-FFF2-40B4-BE49-F238E27FC236}">
+                  <a16:creationId xmlns:a16="http://schemas.microsoft.com/office/drawing/2014/main" id="{D9169543-CD61-44A2-BFBC-C4579157DA6A}"/>
+                </a:ext>
+              </a:extLst>
+            </p:cNvPr>
+            <p:cNvGrpSpPr/>
+            <p:nvPr/>
+          </p:nvGrpSpPr>
+          <p:grpSpPr>
+            <a:xfrm>
+              <a:off x="379453" y="1957897"/>
+              <a:ext cx="1883455" cy="2148779"/>
+              <a:chOff x="1307268" y="1182175"/>
+              <a:chExt cx="4077936" cy="4652398"/>
+            </a:xfrm>
+            <a:gradFill flip="none" rotWithShape="1">
+              <a:gsLst>
+                <a:gs pos="0">
+                  <a:srgbClr val="0998DC"/>
+                </a:gs>
+                <a:gs pos="100000">
+                  <a:srgbClr val="2D388A"/>
+                </a:gs>
+              </a:gsLst>
+              <a:lin ang="10800000" scaled="1"/>
+              <a:tileRect/>
+            </a:gradFill>
+          </p:grpSpPr>
+          <p:sp>
+            <p:nvSpPr>
+              <p:cNvPr id="16" name="Freeform: Shape 15">
+                <a:extLst>
+                  <a:ext uri="{FF2B5EF4-FFF2-40B4-BE49-F238E27FC236}">
+                    <a16:creationId xmlns:a16="http://schemas.microsoft.com/office/drawing/2014/main" id="{D3B5FFC9-308B-4670-AF36-5F9EAC518B2D}"/>
+                  </a:ext>
+                </a:extLst>
+              </p:cNvPr>
+              <p:cNvSpPr/>
+              <p:nvPr/>
+            </p:nvSpPr>
+            <p:spPr>
+              <a:xfrm>
+                <a:off x="1307268" y="1182175"/>
+                <a:ext cx="4077936" cy="4652398"/>
+              </a:xfrm>
+              <a:custGeom>
+                <a:avLst/>
+                <a:gdLst>
+                  <a:gd name="connsiteX0" fmla="*/ 4026263 w 4077936"/>
+                  <a:gd name="connsiteY0" fmla="*/ 2509654 h 4652398"/>
+                  <a:gd name="connsiteX1" fmla="*/ 3659349 w 4077936"/>
+                  <a:gd name="connsiteY1" fmla="*/ 1951953 h 4652398"/>
+                  <a:gd name="connsiteX2" fmla="*/ 3644673 w 4077936"/>
+                  <a:gd name="connsiteY2" fmla="*/ 1903032 h 4652398"/>
+                  <a:gd name="connsiteX3" fmla="*/ 2079176 w 4077936"/>
+                  <a:gd name="connsiteY3" fmla="*/ 450074 h 4652398"/>
+                  <a:gd name="connsiteX4" fmla="*/ 1164338 w 4077936"/>
+                  <a:gd name="connsiteY4" fmla="*/ 0 h 4652398"/>
+                  <a:gd name="connsiteX5" fmla="*/ 0 w 4077936"/>
+                  <a:gd name="connsiteY5" fmla="*/ 1169215 h 4652398"/>
+                  <a:gd name="connsiteX6" fmla="*/ 464757 w 4077936"/>
+                  <a:gd name="connsiteY6" fmla="*/ 2098716 h 4652398"/>
+                  <a:gd name="connsiteX7" fmla="*/ 1095848 w 4077936"/>
+                  <a:gd name="connsiteY7" fmla="*/ 3404910 h 4652398"/>
+                  <a:gd name="connsiteX8" fmla="*/ 1115417 w 4077936"/>
+                  <a:gd name="connsiteY8" fmla="*/ 3439155 h 4652398"/>
+                  <a:gd name="connsiteX9" fmla="*/ 1115417 w 4077936"/>
+                  <a:gd name="connsiteY9" fmla="*/ 4270814 h 4652398"/>
+                  <a:gd name="connsiteX10" fmla="*/ 1364918 w 4077936"/>
+                  <a:gd name="connsiteY10" fmla="*/ 4539880 h 4652398"/>
+                  <a:gd name="connsiteX11" fmla="*/ 2612423 w 4077936"/>
+                  <a:gd name="connsiteY11" fmla="*/ 4652399 h 4652398"/>
+                  <a:gd name="connsiteX12" fmla="*/ 2636884 w 4077936"/>
+                  <a:gd name="connsiteY12" fmla="*/ 4652399 h 4652398"/>
+                  <a:gd name="connsiteX13" fmla="*/ 2822787 w 4077936"/>
+                  <a:gd name="connsiteY13" fmla="*/ 4579017 h 4652398"/>
+                  <a:gd name="connsiteX14" fmla="*/ 2910846 w 4077936"/>
+                  <a:gd name="connsiteY14" fmla="*/ 4378440 h 4652398"/>
+                  <a:gd name="connsiteX15" fmla="*/ 2910846 w 4077936"/>
+                  <a:gd name="connsiteY15" fmla="*/ 3864769 h 4652398"/>
+                  <a:gd name="connsiteX16" fmla="*/ 3272867 w 4077936"/>
+                  <a:gd name="connsiteY16" fmla="*/ 3864769 h 4652398"/>
+                  <a:gd name="connsiteX17" fmla="*/ 3659349 w 4077936"/>
+                  <a:gd name="connsiteY17" fmla="*/ 3478292 h 4652398"/>
+                  <a:gd name="connsiteX18" fmla="*/ 3659349 w 4077936"/>
+                  <a:gd name="connsiteY18" fmla="*/ 2993973 h 4652398"/>
+                  <a:gd name="connsiteX19" fmla="*/ 3771870 w 4077936"/>
+                  <a:gd name="connsiteY19" fmla="*/ 2993973 h 4652398"/>
+                  <a:gd name="connsiteX20" fmla="*/ 4040939 w 4077936"/>
+                  <a:gd name="connsiteY20" fmla="*/ 2832533 h 4652398"/>
+                  <a:gd name="connsiteX21" fmla="*/ 4026263 w 4077936"/>
+                  <a:gd name="connsiteY21" fmla="*/ 2509654 h 4652398"/>
+                  <a:gd name="connsiteX22" fmla="*/ 293531 w 4077936"/>
+                  <a:gd name="connsiteY22" fmla="*/ 1169215 h 4652398"/>
+                  <a:gd name="connsiteX23" fmla="*/ 1174123 w 4077936"/>
+                  <a:gd name="connsiteY23" fmla="*/ 288635 h 4652398"/>
+                  <a:gd name="connsiteX24" fmla="*/ 2054715 w 4077936"/>
+                  <a:gd name="connsiteY24" fmla="*/ 1169215 h 4652398"/>
+                  <a:gd name="connsiteX25" fmla="*/ 1174123 w 4077936"/>
+                  <a:gd name="connsiteY25" fmla="*/ 2049795 h 4652398"/>
+                  <a:gd name="connsiteX26" fmla="*/ 293531 w 4077936"/>
+                  <a:gd name="connsiteY26" fmla="*/ 1169215 h 4652398"/>
+                  <a:gd name="connsiteX27" fmla="*/ 3771870 w 4077936"/>
+                  <a:gd name="connsiteY27" fmla="*/ 2695554 h 4652398"/>
+                  <a:gd name="connsiteX28" fmla="*/ 3556614 w 4077936"/>
+                  <a:gd name="connsiteY28" fmla="*/ 2695554 h 4652398"/>
+                  <a:gd name="connsiteX29" fmla="*/ 3365819 w 4077936"/>
+                  <a:gd name="connsiteY29" fmla="*/ 2886346 h 4652398"/>
+                  <a:gd name="connsiteX30" fmla="*/ 3365819 w 4077936"/>
+                  <a:gd name="connsiteY30" fmla="*/ 3468508 h 4652398"/>
+                  <a:gd name="connsiteX31" fmla="*/ 3267975 w 4077936"/>
+                  <a:gd name="connsiteY31" fmla="*/ 3566350 h 4652398"/>
+                  <a:gd name="connsiteX32" fmla="*/ 2832571 w 4077936"/>
+                  <a:gd name="connsiteY32" fmla="*/ 3566350 h 4652398"/>
+                  <a:gd name="connsiteX33" fmla="*/ 2617315 w 4077936"/>
+                  <a:gd name="connsiteY33" fmla="*/ 3781603 h 4652398"/>
+                  <a:gd name="connsiteX34" fmla="*/ 2617315 w 4077936"/>
+                  <a:gd name="connsiteY34" fmla="*/ 4349088 h 4652398"/>
+                  <a:gd name="connsiteX35" fmla="*/ 1404055 w 4077936"/>
+                  <a:gd name="connsiteY35" fmla="*/ 4246354 h 4652398"/>
+                  <a:gd name="connsiteX36" fmla="*/ 1404055 w 4077936"/>
+                  <a:gd name="connsiteY36" fmla="*/ 3434263 h 4652398"/>
+                  <a:gd name="connsiteX37" fmla="*/ 1286643 w 4077936"/>
+                  <a:gd name="connsiteY37" fmla="*/ 3179873 h 4652398"/>
+                  <a:gd name="connsiteX38" fmla="*/ 772964 w 4077936"/>
+                  <a:gd name="connsiteY38" fmla="*/ 2265048 h 4652398"/>
+                  <a:gd name="connsiteX39" fmla="*/ 1169231 w 4077936"/>
+                  <a:gd name="connsiteY39" fmla="*/ 2338430 h 4652398"/>
+                  <a:gd name="connsiteX40" fmla="*/ 2338461 w 4077936"/>
+                  <a:gd name="connsiteY40" fmla="*/ 1169215 h 4652398"/>
+                  <a:gd name="connsiteX41" fmla="*/ 2260186 w 4077936"/>
+                  <a:gd name="connsiteY41" fmla="*/ 763170 h 4652398"/>
+                  <a:gd name="connsiteX42" fmla="*/ 3356034 w 4077936"/>
+                  <a:gd name="connsiteY42" fmla="*/ 1932384 h 4652398"/>
+                  <a:gd name="connsiteX43" fmla="*/ 3409848 w 4077936"/>
+                  <a:gd name="connsiteY43" fmla="*/ 2108500 h 4652398"/>
+                  <a:gd name="connsiteX44" fmla="*/ 3781654 w 4077936"/>
+                  <a:gd name="connsiteY44" fmla="*/ 2690662 h 4652398"/>
+                  <a:gd name="connsiteX45" fmla="*/ 3771870 w 4077936"/>
+                  <a:gd name="connsiteY45" fmla="*/ 2695554 h 4652398"/>
+                </a:gdLst>
+                <a:ahLst/>
+                <a:cxnLst>
+                  <a:cxn ang="0">
+                    <a:pos x="connsiteX0" y="connsiteY0"/>
+                  </a:cxn>
+                  <a:cxn ang="0">
+                    <a:pos x="connsiteX1" y="connsiteY1"/>
+                  </a:cxn>
+                  <a:cxn ang="0">
+                    <a:pos x="connsiteX2" y="connsiteY2"/>
+                  </a:cxn>
+                  <a:cxn ang="0">
+                    <a:pos x="connsiteX3" y="connsiteY3"/>
+                  </a:cxn>
+                  <a:cxn ang="0">
+                    <a:pos x="connsiteX4" y="connsiteY4"/>
+                  </a:cxn>
+                  <a:cxn ang="0">
+                    <a:pos x="connsiteX5" y="connsiteY5"/>
+                  </a:cxn>
+                  <a:cxn ang="0">
+                    <a:pos x="connsiteX6" y="connsiteY6"/>
+                  </a:cxn>
+                  <a:cxn ang="0">
+                    <a:pos x="connsiteX7" y="connsiteY7"/>
+                  </a:cxn>
+                  <a:cxn ang="0">
+                    <a:pos x="connsiteX8" y="connsiteY8"/>
+                  </a:cxn>
+                  <a:cxn ang="0">
+                    <a:pos x="connsiteX9" y="connsiteY9"/>
+                  </a:cxn>
+                  <a:cxn ang="0">
+                    <a:pos x="connsiteX10" y="connsiteY10"/>
+                  </a:cxn>
+                  <a:cxn ang="0">
+                    <a:pos x="connsiteX11" y="connsiteY11"/>
+                  </a:cxn>
+                  <a:cxn ang="0">
+                    <a:pos x="connsiteX12" y="connsiteY12"/>
+                  </a:cxn>
+                  <a:cxn ang="0">
+                    <a:pos x="connsiteX13" y="connsiteY13"/>
+                  </a:cxn>
+                  <a:cxn ang="0">
+                    <a:pos x="connsiteX14" y="connsiteY14"/>
+                  </a:cxn>
+                  <a:cxn ang="0">
+                    <a:pos x="connsiteX15" y="connsiteY15"/>
+                  </a:cxn>
+                  <a:cxn ang="0">
+                    <a:pos x="connsiteX16" y="connsiteY16"/>
+                  </a:cxn>
+                  <a:cxn ang="0">
+                    <a:pos x="connsiteX17" y="connsiteY17"/>
+                  </a:cxn>
+                  <a:cxn ang="0">
+                    <a:pos x="connsiteX18" y="connsiteY18"/>
+                  </a:cxn>
+                  <a:cxn ang="0">
+                    <a:pos x="connsiteX19" y="connsiteY19"/>
+                  </a:cxn>
+                  <a:cxn ang="0">
+                    <a:pos x="connsiteX20" y="connsiteY20"/>
+                  </a:cxn>
+                  <a:cxn ang="0">
+                    <a:pos x="connsiteX21" y="connsiteY21"/>
+                  </a:cxn>
+                  <a:cxn ang="0">
+                    <a:pos x="connsiteX22" y="connsiteY22"/>
+                  </a:cxn>
+                  <a:cxn ang="0">
+                    <a:pos x="connsiteX23" y="connsiteY23"/>
+                  </a:cxn>
+                  <a:cxn ang="0">
+                    <a:pos x="connsiteX24" y="connsiteY24"/>
+                  </a:cxn>
+                  <a:cxn ang="0">
+                    <a:pos x="connsiteX25" y="connsiteY25"/>
+                  </a:cxn>
+                  <a:cxn ang="0">
+                    <a:pos x="connsiteX26" y="connsiteY26"/>
+                  </a:cxn>
+                  <a:cxn ang="0">
+                    <a:pos x="connsiteX27" y="connsiteY27"/>
+                  </a:cxn>
+                  <a:cxn ang="0">
+                    <a:pos x="connsiteX28" y="connsiteY28"/>
+                  </a:cxn>
+                  <a:cxn ang="0">
+                    <a:pos x="connsiteX29" y="connsiteY29"/>
+                  </a:cxn>
+                  <a:cxn ang="0">
+                    <a:pos x="connsiteX30" y="connsiteY30"/>
+                  </a:cxn>
+                  <a:cxn ang="0">
+                    <a:pos x="connsiteX31" y="connsiteY31"/>
+                  </a:cxn>
+                  <a:cxn ang="0">
+                    <a:pos x="connsiteX32" y="connsiteY32"/>
+                  </a:cxn>
+                  <a:cxn ang="0">
+                    <a:pos x="connsiteX33" y="connsiteY33"/>
+                  </a:cxn>
+                  <a:cxn ang="0">
+                    <a:pos x="connsiteX34" y="connsiteY34"/>
+                  </a:cxn>
+                  <a:cxn ang="0">
+                    <a:pos x="connsiteX35" y="connsiteY35"/>
+                  </a:cxn>
+                  <a:cxn ang="0">
+                    <a:pos x="connsiteX36" y="connsiteY36"/>
+                  </a:cxn>
+                  <a:cxn ang="0">
+                    <a:pos x="connsiteX37" y="connsiteY37"/>
+                  </a:cxn>
+                  <a:cxn ang="0">
+                    <a:pos x="connsiteX38" y="connsiteY38"/>
+                  </a:cxn>
+                  <a:cxn ang="0">
+                    <a:pos x="connsiteX39" y="connsiteY39"/>
+                  </a:cxn>
+                  <a:cxn ang="0">
+                    <a:pos x="connsiteX40" y="connsiteY40"/>
+                  </a:cxn>
+                  <a:cxn ang="0">
+                    <a:pos x="connsiteX41" y="connsiteY41"/>
+                  </a:cxn>
+                  <a:cxn ang="0">
+                    <a:pos x="connsiteX42" y="connsiteY42"/>
+                  </a:cxn>
+                  <a:cxn ang="0">
+                    <a:pos x="connsiteX43" y="connsiteY43"/>
+                  </a:cxn>
+                  <a:cxn ang="0">
+                    <a:pos x="connsiteX44" y="connsiteY44"/>
+                  </a:cxn>
+                  <a:cxn ang="0">
+                    <a:pos x="connsiteX45" y="connsiteY45"/>
+                  </a:cxn>
+                </a:cxnLst>
+                <a:rect l="l" t="t" r="r" b="b"/>
+                <a:pathLst>
+                  <a:path w="4077936" h="4652398">
+                    <a:moveTo>
+                      <a:pt x="4026263" y="2509654"/>
+                    </a:moveTo>
+                    <a:lnTo>
+                      <a:pt x="3659349" y="1951953"/>
+                    </a:lnTo>
+                    <a:cubicBezTo>
+                      <a:pt x="3649565" y="1937276"/>
+                      <a:pt x="3644673" y="1922600"/>
+                      <a:pt x="3644673" y="1903032"/>
+                    </a:cubicBezTo>
+                    <a:cubicBezTo>
+                      <a:pt x="3571290" y="1081157"/>
+                      <a:pt x="2901062" y="459859"/>
+                      <a:pt x="2079176" y="450074"/>
+                    </a:cubicBezTo>
+                    <a:cubicBezTo>
+                      <a:pt x="1863920" y="176116"/>
+                      <a:pt x="1536144" y="0"/>
+                      <a:pt x="1164338" y="0"/>
+                    </a:cubicBezTo>
+                    <a:cubicBezTo>
+                      <a:pt x="523463" y="0"/>
+                      <a:pt x="0" y="523456"/>
+                      <a:pt x="0" y="1169215"/>
+                    </a:cubicBezTo>
+                    <a:cubicBezTo>
+                      <a:pt x="0" y="1550800"/>
+                      <a:pt x="185903" y="1883463"/>
+                      <a:pt x="464757" y="2098716"/>
+                    </a:cubicBezTo>
+                    <a:cubicBezTo>
+                      <a:pt x="479433" y="2592819"/>
+                      <a:pt x="714258" y="3077139"/>
+                      <a:pt x="1095848" y="3404910"/>
+                    </a:cubicBezTo>
+                    <a:cubicBezTo>
+                      <a:pt x="1100740" y="3409802"/>
+                      <a:pt x="1115417" y="3419586"/>
+                      <a:pt x="1115417" y="3439155"/>
+                    </a:cubicBezTo>
+                    <a:lnTo>
+                      <a:pt x="1115417" y="4270814"/>
+                    </a:lnTo>
+                    <a:cubicBezTo>
+                      <a:pt x="1115417" y="4412685"/>
+                      <a:pt x="1223045" y="4530096"/>
+                      <a:pt x="1364918" y="4539880"/>
+                    </a:cubicBezTo>
+                    <a:lnTo>
+                      <a:pt x="2612423" y="4652399"/>
+                    </a:lnTo>
+                    <a:cubicBezTo>
+                      <a:pt x="2622208" y="4652399"/>
+                      <a:pt x="2627100" y="4652399"/>
+                      <a:pt x="2636884" y="4652399"/>
+                    </a:cubicBezTo>
+                    <a:cubicBezTo>
+                      <a:pt x="2705375" y="4652399"/>
+                      <a:pt x="2768973" y="4627938"/>
+                      <a:pt x="2822787" y="4579017"/>
+                    </a:cubicBezTo>
+                    <a:cubicBezTo>
+                      <a:pt x="2876601" y="4530096"/>
+                      <a:pt x="2910846" y="4456714"/>
+                      <a:pt x="2910846" y="4378440"/>
+                    </a:cubicBezTo>
+                    <a:lnTo>
+                      <a:pt x="2910846" y="3864769"/>
+                    </a:lnTo>
+                    <a:lnTo>
+                      <a:pt x="3272867" y="3864769"/>
+                    </a:lnTo>
+                    <a:cubicBezTo>
+                      <a:pt x="3488123" y="3864769"/>
+                      <a:pt x="3659349" y="3688653"/>
+                      <a:pt x="3659349" y="3478292"/>
+                    </a:cubicBezTo>
+                    <a:lnTo>
+                      <a:pt x="3659349" y="2993973"/>
+                    </a:lnTo>
+                    <a:lnTo>
+                      <a:pt x="3771870" y="2993973"/>
+                    </a:lnTo>
+                    <a:cubicBezTo>
+                      <a:pt x="3884390" y="2993973"/>
+                      <a:pt x="3987126" y="2930375"/>
+                      <a:pt x="4040939" y="2832533"/>
+                    </a:cubicBezTo>
+                    <a:cubicBezTo>
+                      <a:pt x="4094753" y="2724907"/>
+                      <a:pt x="4089861" y="2607496"/>
+                      <a:pt x="4026263" y="2509654"/>
+                    </a:cubicBezTo>
+                    <a:close/>
+                    <a:moveTo>
+                      <a:pt x="293531" y="1169215"/>
+                    </a:moveTo>
+                    <a:cubicBezTo>
+                      <a:pt x="293531" y="684896"/>
+                      <a:pt x="689797" y="288635"/>
+                      <a:pt x="1174123" y="288635"/>
+                    </a:cubicBezTo>
+                    <a:cubicBezTo>
+                      <a:pt x="1658449" y="288635"/>
+                      <a:pt x="2054715" y="684896"/>
+                      <a:pt x="2054715" y="1169215"/>
+                    </a:cubicBezTo>
+                    <a:cubicBezTo>
+                      <a:pt x="2054715" y="1653534"/>
+                      <a:pt x="1658449" y="2049795"/>
+                      <a:pt x="1174123" y="2049795"/>
+                    </a:cubicBezTo>
+                    <a:cubicBezTo>
+                      <a:pt x="689797" y="2049795"/>
+                      <a:pt x="293531" y="1653534"/>
+                      <a:pt x="293531" y="1169215"/>
+                    </a:cubicBezTo>
+                    <a:close/>
+                    <a:moveTo>
+                      <a:pt x="3771870" y="2695554"/>
+                    </a:moveTo>
+                    <a:lnTo>
+                      <a:pt x="3556614" y="2695554"/>
+                    </a:lnTo>
+                    <a:cubicBezTo>
+                      <a:pt x="3448986" y="2695554"/>
+                      <a:pt x="3365819" y="2783612"/>
+                      <a:pt x="3365819" y="2886346"/>
+                    </a:cubicBezTo>
+                    <a:lnTo>
+                      <a:pt x="3365819" y="3468508"/>
+                    </a:lnTo>
+                    <a:cubicBezTo>
+                      <a:pt x="3365819" y="3522321"/>
+                      <a:pt x="3321789" y="3566350"/>
+                      <a:pt x="3267975" y="3566350"/>
+                    </a:cubicBezTo>
+                    <a:lnTo>
+                      <a:pt x="2832571" y="3566350"/>
+                    </a:lnTo>
+                    <a:cubicBezTo>
+                      <a:pt x="2715159" y="3566350"/>
+                      <a:pt x="2617315" y="3664192"/>
+                      <a:pt x="2617315" y="3781603"/>
+                    </a:cubicBezTo>
+                    <a:lnTo>
+                      <a:pt x="2617315" y="4349088"/>
+                    </a:lnTo>
+                    <a:lnTo>
+                      <a:pt x="1404055" y="4246354"/>
+                    </a:lnTo>
+                    <a:lnTo>
+                      <a:pt x="1404055" y="3434263"/>
+                    </a:lnTo>
+                    <a:cubicBezTo>
+                      <a:pt x="1404055" y="3336420"/>
+                      <a:pt x="1360026" y="3243470"/>
+                      <a:pt x="1286643" y="3179873"/>
+                    </a:cubicBezTo>
+                    <a:cubicBezTo>
+                      <a:pt x="1017573" y="2949944"/>
+                      <a:pt x="831670" y="2612388"/>
+                      <a:pt x="772964" y="2265048"/>
+                    </a:cubicBezTo>
+                    <a:cubicBezTo>
+                      <a:pt x="895269" y="2309077"/>
+                      <a:pt x="1027357" y="2338430"/>
+                      <a:pt x="1169231" y="2338430"/>
+                    </a:cubicBezTo>
+                    <a:cubicBezTo>
+                      <a:pt x="1814998" y="2338430"/>
+                      <a:pt x="2338461" y="1814974"/>
+                      <a:pt x="2338461" y="1169215"/>
+                    </a:cubicBezTo>
+                    <a:cubicBezTo>
+                      <a:pt x="2338461" y="1027344"/>
+                      <a:pt x="2309108" y="890364"/>
+                      <a:pt x="2260186" y="763170"/>
+                    </a:cubicBezTo>
+                    <a:cubicBezTo>
+                      <a:pt x="2847248" y="851227"/>
+                      <a:pt x="3302221" y="1320870"/>
+                      <a:pt x="3356034" y="1932384"/>
+                    </a:cubicBezTo>
+                    <a:cubicBezTo>
+                      <a:pt x="3360927" y="1995982"/>
+                      <a:pt x="3380495" y="2049795"/>
+                      <a:pt x="3409848" y="2108500"/>
+                    </a:cubicBezTo>
+                    <a:lnTo>
+                      <a:pt x="3781654" y="2690662"/>
+                    </a:lnTo>
+                    <a:cubicBezTo>
+                      <a:pt x="3781654" y="2695554"/>
+                      <a:pt x="3771870" y="2695554"/>
+                      <a:pt x="3771870" y="2695554"/>
+                    </a:cubicBezTo>
+                    <a:close/>
+                  </a:path>
+                </a:pathLst>
+              </a:custGeom>
+              <a:solidFill>
+                <a:schemeClr val="bg1"/>
+              </a:solidFill>
+              <a:ln w="41243" cap="flat">
+                <a:noFill/>
+                <a:prstDash val="solid"/>
+                <a:miter/>
+              </a:ln>
+            </p:spPr>
+            <p:txBody>
+              <a:bodyPr rtlCol="0" anchor="ctr"/>
+              <a:lstStyle/>
+              <a:p>
+                <a:endParaRPr lang="en-GB" dirty="0"/>
+              </a:p>
+            </p:txBody>
+          </p:sp>
+          <p:sp>
+            <p:nvSpPr>
+              <p:cNvPr id="17" name="Freeform: Shape 16">
+                <a:extLst>
+                  <a:ext uri="{FF2B5EF4-FFF2-40B4-BE49-F238E27FC236}">
+                    <a16:creationId xmlns:a16="http://schemas.microsoft.com/office/drawing/2014/main" id="{81BEC71D-3D80-4C1D-AD6C-8D044C0FEDB8}"/>
+                  </a:ext>
+                </a:extLst>
+              </p:cNvPr>
+              <p:cNvSpPr/>
+              <p:nvPr/>
+            </p:nvSpPr>
+            <p:spPr>
+              <a:xfrm>
+                <a:off x="2329734" y="1686063"/>
+                <a:ext cx="714257" cy="812090"/>
+              </a:xfrm>
+              <a:custGeom>
+                <a:avLst/>
+                <a:gdLst>
+                  <a:gd name="connsiteX0" fmla="*/ 146765 w 714257"/>
+                  <a:gd name="connsiteY0" fmla="*/ 812091 h 812090"/>
+                  <a:gd name="connsiteX1" fmla="*/ 567493 w 714257"/>
+                  <a:gd name="connsiteY1" fmla="*/ 812091 h 812090"/>
+                  <a:gd name="connsiteX2" fmla="*/ 714258 w 714257"/>
+                  <a:gd name="connsiteY2" fmla="*/ 665327 h 812090"/>
+                  <a:gd name="connsiteX3" fmla="*/ 567493 w 714257"/>
+                  <a:gd name="connsiteY3" fmla="*/ 518564 h 812090"/>
+                  <a:gd name="connsiteX4" fmla="*/ 293531 w 714257"/>
+                  <a:gd name="connsiteY4" fmla="*/ 518564 h 812090"/>
+                  <a:gd name="connsiteX5" fmla="*/ 293531 w 714257"/>
+                  <a:gd name="connsiteY5" fmla="*/ 146763 h 812090"/>
+                  <a:gd name="connsiteX6" fmla="*/ 146765 w 714257"/>
+                  <a:gd name="connsiteY6" fmla="*/ 0 h 812090"/>
+                  <a:gd name="connsiteX7" fmla="*/ 0 w 714257"/>
+                  <a:gd name="connsiteY7" fmla="*/ 146763 h 812090"/>
+                  <a:gd name="connsiteX8" fmla="*/ 0 w 714257"/>
+                  <a:gd name="connsiteY8" fmla="*/ 660435 h 812090"/>
+                  <a:gd name="connsiteX9" fmla="*/ 146765 w 714257"/>
+                  <a:gd name="connsiteY9" fmla="*/ 812091 h 812090"/>
+                </a:gdLst>
+                <a:ahLst/>
+                <a:cxnLst>
+                  <a:cxn ang="0">
+                    <a:pos x="connsiteX0" y="connsiteY0"/>
+                  </a:cxn>
+                  <a:cxn ang="0">
+                    <a:pos x="connsiteX1" y="connsiteY1"/>
+                  </a:cxn>
+                  <a:cxn ang="0">
+                    <a:pos x="connsiteX2" y="connsiteY2"/>
+                  </a:cxn>
+                  <a:cxn ang="0">
+                    <a:pos x="connsiteX3" y="connsiteY3"/>
+                  </a:cxn>
+                  <a:cxn ang="0">
+                    <a:pos x="connsiteX4" y="connsiteY4"/>
+                  </a:cxn>
+                  <a:cxn ang="0">
+                    <a:pos x="connsiteX5" y="connsiteY5"/>
+                  </a:cxn>
+                  <a:cxn ang="0">
+                    <a:pos x="connsiteX6" y="connsiteY6"/>
+                  </a:cxn>
+                  <a:cxn ang="0">
+                    <a:pos x="connsiteX7" y="connsiteY7"/>
+                  </a:cxn>
+                  <a:cxn ang="0">
+                    <a:pos x="connsiteX8" y="connsiteY8"/>
+                  </a:cxn>
+                  <a:cxn ang="0">
+                    <a:pos x="connsiteX9" y="connsiteY9"/>
+                  </a:cxn>
+                </a:cxnLst>
+                <a:rect l="l" t="t" r="r" b="b"/>
+                <a:pathLst>
+                  <a:path w="714257" h="812090">
+                    <a:moveTo>
+                      <a:pt x="146765" y="812091"/>
+                    </a:moveTo>
+                    <a:lnTo>
+                      <a:pt x="567493" y="812091"/>
+                    </a:lnTo>
+                    <a:cubicBezTo>
+                      <a:pt x="645768" y="812091"/>
+                      <a:pt x="714258" y="748493"/>
+                      <a:pt x="714258" y="665327"/>
+                    </a:cubicBezTo>
+                    <a:cubicBezTo>
+                      <a:pt x="714258" y="587053"/>
+                      <a:pt x="650660" y="518564"/>
+                      <a:pt x="567493" y="518564"/>
+                    </a:cubicBezTo>
+                    <a:lnTo>
+                      <a:pt x="293531" y="518564"/>
+                    </a:lnTo>
+                    <a:lnTo>
+                      <a:pt x="293531" y="146763"/>
+                    </a:lnTo>
+                    <a:cubicBezTo>
+                      <a:pt x="293531" y="68490"/>
+                      <a:pt x="229932" y="0"/>
+                      <a:pt x="146765" y="0"/>
+                    </a:cubicBezTo>
+                    <a:cubicBezTo>
+                      <a:pt x="68490" y="0"/>
+                      <a:pt x="0" y="63597"/>
+                      <a:pt x="0" y="146763"/>
+                    </a:cubicBezTo>
+                    <a:lnTo>
+                      <a:pt x="0" y="660435"/>
+                    </a:lnTo>
+                    <a:cubicBezTo>
+                      <a:pt x="4892" y="743601"/>
+                      <a:pt x="68490" y="812091"/>
+                      <a:pt x="146765" y="812091"/>
+                    </a:cubicBezTo>
+                    <a:close/>
+                  </a:path>
+                </a:pathLst>
+              </a:custGeom>
+              <a:solidFill>
+                <a:schemeClr val="bg1"/>
+              </a:solidFill>
+              <a:ln w="41243" cap="flat">
+                <a:noFill/>
+                <a:prstDash val="solid"/>
+                <a:miter/>
+              </a:ln>
+            </p:spPr>
+            <p:txBody>
+              <a:bodyPr rtlCol="0" anchor="ctr"/>
+              <a:lstStyle/>
+              <a:p>
+                <a:endParaRPr lang="en-GB" dirty="0"/>
+              </a:p>
+            </p:txBody>
+          </p:sp>
+        </p:grpSp>
+      </p:grpSp>
+      <p:pic>
+        <p:nvPicPr>
+          <p:cNvPr id="3" name="Picture 2" descr="A picture containing drawing&#10;&#10;Description automatically generated">
+            <a:extLst>
+              <a:ext uri="{FF2B5EF4-FFF2-40B4-BE49-F238E27FC236}">
+                <a16:creationId xmlns:a16="http://schemas.microsoft.com/office/drawing/2014/main" id="{AAF419F8-F375-498D-A0BC-AEDA41A27065}"/>
+              </a:ext>
+            </a:extLst>
+          </p:cNvPr>
+          <p:cNvPicPr>
+            <a:picLocks noChangeAspect="1"/>
+          </p:cNvPicPr>
+          <p:nvPr/>
+        </p:nvPicPr>
+        <p:blipFill rotWithShape="1">
+          <a:blip r:embed="rId2">
+            <a:extLst>
+              <a:ext uri="{28A0092B-C50C-407E-A947-70E740481C1C}">
+                <a14:useLocalDpi xmlns:a14="http://schemas.microsoft.com/office/drawing/2010/main" val="0"/>
+              </a:ext>
+            </a:extLst>
+          </a:blip>
+          <a:srcRect t="13925" r="10379" b="36108"/>
+          <a:stretch/>
+        </p:blipFill>
+        <p:spPr>
+          <a:xfrm>
+            <a:off x="379453" y="3127761"/>
+            <a:ext cx="10926633" cy="2016807"/>
+          </a:xfrm>
+          <a:prstGeom prst="rect">
+            <a:avLst/>
+          </a:prstGeom>
+        </p:spPr>
+      </p:pic>
+    </p:spTree>
+    <p:extLst>
+      <p:ext uri="{BB962C8B-B14F-4D97-AF65-F5344CB8AC3E}">
+        <p14:creationId xmlns:p14="http://schemas.microsoft.com/office/powerpoint/2010/main" val="1527958744"/>
+      </p:ext>
+    </p:extLst>
+  </p:cSld>
+  <p:clrMapOvr>
+    <a:masterClrMapping/>
+  </p:clrMapOvr>
+</p:sld>
+</file>
+
+<file path=ppt/slides/slide6.xml><?xml version="1.0" encoding="utf-8"?>
+<p:sld xmlns:a="http://schemas.openxmlformats.org/drawingml/2006/main" xmlns:r="http://schemas.openxmlformats.org/officeDocument/2006/relationships" xmlns:p="http://schemas.openxmlformats.org/presentationml/2006/main">
+  <p:cSld>
     <p:spTree>
       <p:nvGrpSpPr>
         <p:cNvPr id="1" name=""/>
@@ -9881,7 +11441,7 @@
 </p:sld>
 </file>
 
-<file path=ppt/slides/slide6.xml><?xml version="1.0" encoding="utf-8"?>
+<file path=ppt/slides/slide7.xml><?xml version="1.0" encoding="utf-8"?>
 <p:sld xmlns:a="http://schemas.openxmlformats.org/drawingml/2006/main" xmlns:r="http://schemas.openxmlformats.org/officeDocument/2006/relationships" xmlns:p="http://schemas.openxmlformats.org/presentationml/2006/main">
   <p:cSld>
     <p:bg>
@@ -10589,7 +12149,7 @@
 </p:sld>
 </file>
 
-<file path=ppt/slides/slide7.xml><?xml version="1.0" encoding="utf-8"?>
+<file path=ppt/slides/slide8.xml><?xml version="1.0" encoding="utf-8"?>
 <p:sld xmlns:a="http://schemas.openxmlformats.org/drawingml/2006/main" xmlns:r="http://schemas.openxmlformats.org/officeDocument/2006/relationships" xmlns:p="http://schemas.openxmlformats.org/presentationml/2006/main">
   <p:cSld>
     <p:spTree>
@@ -10655,9 +12215,17 @@
 </p:sld>
 </file>
 
-<file path=ppt/slides/slide8.xml><?xml version="1.0" encoding="utf-8"?>
+<file path=ppt/slides/slide9.xml><?xml version="1.0" encoding="utf-8"?>
 <p:sld xmlns:a="http://schemas.openxmlformats.org/drawingml/2006/main" xmlns:r="http://schemas.openxmlformats.org/officeDocument/2006/relationships" xmlns:p="http://schemas.openxmlformats.org/presentationml/2006/main">
   <p:cSld>
+    <p:bg>
+      <p:bgPr>
+        <a:solidFill>
+          <a:schemeClr val="tx1"/>
+        </a:solidFill>
+        <a:effectLst/>
+      </p:bgPr>
+    </p:bg>
     <p:spTree>
       <p:nvGrpSpPr>
         <p:cNvPr id="1" name=""/>
@@ -10672,59 +12240,127 @@
           <a:chExt cx="0" cy="0"/>
         </a:xfrm>
       </p:grpSpPr>
-      <p:sp>
-        <p:nvSpPr>
-          <p:cNvPr id="5" name="Rectangle 4">
+      <p:pic>
+        <p:nvPicPr>
+          <p:cNvPr id="3" name="Graphic 2">
             <a:extLst>
               <a:ext uri="{FF2B5EF4-FFF2-40B4-BE49-F238E27FC236}">
-                <a16:creationId xmlns:a16="http://schemas.microsoft.com/office/drawing/2014/main" id="{2E5719A5-53CC-4C02-B198-2F57B06F8181}"/>
+                <a16:creationId xmlns:a16="http://schemas.microsoft.com/office/drawing/2014/main" id="{22EFD3FA-23DF-4845-BECE-67A7DF9BE3BE}"/>
               </a:ext>
             </a:extLst>
           </p:cNvPr>
-          <p:cNvSpPr/>
+          <p:cNvPicPr>
+            <a:picLocks noChangeAspect="1"/>
+          </p:cNvPicPr>
           <p:nvPr/>
-        </p:nvSpPr>
+        </p:nvPicPr>
+        <p:blipFill>
+          <a:blip r:embed="rId2">
+            <a:extLst>
+              <a:ext uri="{28A0092B-C50C-407E-A947-70E740481C1C}">
+                <a14:useLocalDpi xmlns:a14="http://schemas.microsoft.com/office/drawing/2010/main" val="0"/>
+              </a:ext>
+              <a:ext uri="{96DAC541-7B7A-43D3-8B79-37D633B846F1}">
+                <asvg:svgBlip xmlns:asvg="http://schemas.microsoft.com/office/drawing/2016/SVG/main" r:embed="rId3"/>
+              </a:ext>
+            </a:extLst>
+          </a:blip>
+          <a:stretch>
+            <a:fillRect/>
+          </a:stretch>
+        </p:blipFill>
         <p:spPr>
           <a:xfrm>
-            <a:off x="0" y="0"/>
-            <a:ext cx="4234649" cy="6858000"/>
+            <a:off x="417161" y="350071"/>
+            <a:ext cx="5486400" cy="5486400"/>
           </a:xfrm>
           <a:prstGeom prst="rect">
             <a:avLst/>
           </a:prstGeom>
-          <a:solidFill>
-            <a:srgbClr val="00B0F0"/>
-          </a:solidFill>
         </p:spPr>
-        <p:style>
-          <a:lnRef idx="2">
-            <a:schemeClr val="accent1">
-              <a:shade val="50000"/>
-            </a:schemeClr>
-          </a:lnRef>
-          <a:fillRef idx="1">
-            <a:schemeClr val="accent1"/>
-          </a:fillRef>
-          <a:effectRef idx="0">
-            <a:schemeClr val="accent1"/>
-          </a:effectRef>
-          <a:fontRef idx="minor">
-            <a:schemeClr val="lt1"/>
-          </a:fontRef>
-        </p:style>
-        <p:txBody>
-          <a:bodyPr rtlCol="0" anchor="ctr"/>
-          <a:lstStyle/>
-          <a:p>
-            <a:pPr algn="ctr"/>
-            <a:endParaRPr lang="en-GB"/>
-          </a:p>
-        </p:txBody>
-      </p:sp>
+      </p:pic>
+      <p:pic>
+        <p:nvPicPr>
+          <p:cNvPr id="5" name="Graphic 4">
+            <a:extLst>
+              <a:ext uri="{FF2B5EF4-FFF2-40B4-BE49-F238E27FC236}">
+                <a16:creationId xmlns:a16="http://schemas.microsoft.com/office/drawing/2014/main" id="{CA41D45C-E5DE-4AEA-8B0B-FC50873C75B3}"/>
+              </a:ext>
+            </a:extLst>
+          </p:cNvPr>
+          <p:cNvPicPr>
+            <a:picLocks noChangeAspect="1"/>
+          </p:cNvPicPr>
+          <p:nvPr/>
+        </p:nvPicPr>
+        <p:blipFill>
+          <a:blip r:embed="rId4">
+            <a:extLst>
+              <a:ext uri="{28A0092B-C50C-407E-A947-70E740481C1C}">
+                <a14:useLocalDpi xmlns:a14="http://schemas.microsoft.com/office/drawing/2010/main" val="0"/>
+              </a:ext>
+              <a:ext uri="{96DAC541-7B7A-43D3-8B79-37D633B846F1}">
+                <asvg:svgBlip xmlns:asvg="http://schemas.microsoft.com/office/drawing/2016/SVG/main" r:embed="rId5"/>
+              </a:ext>
+            </a:extLst>
+          </a:blip>
+          <a:stretch>
+            <a:fillRect/>
+          </a:stretch>
+        </p:blipFill>
+        <p:spPr>
+          <a:xfrm>
+            <a:off x="5143066" y="441673"/>
+            <a:ext cx="5486400" cy="5486400"/>
+          </a:xfrm>
+          <a:prstGeom prst="rect">
+            <a:avLst/>
+          </a:prstGeom>
+        </p:spPr>
+      </p:pic>
+      <p:pic>
+        <p:nvPicPr>
+          <p:cNvPr id="7" name="Graphic 6">
+            <a:extLst>
+              <a:ext uri="{FF2B5EF4-FFF2-40B4-BE49-F238E27FC236}">
+                <a16:creationId xmlns:a16="http://schemas.microsoft.com/office/drawing/2014/main" id="{FC0B1ECB-69D9-4809-8142-DE3AFAE1A3FE}"/>
+              </a:ext>
+            </a:extLst>
+          </p:cNvPr>
+          <p:cNvPicPr>
+            <a:picLocks noChangeAspect="1"/>
+          </p:cNvPicPr>
+          <p:nvPr/>
+        </p:nvPicPr>
+        <p:blipFill>
+          <a:blip r:embed="rId6">
+            <a:extLst>
+              <a:ext uri="{28A0092B-C50C-407E-A947-70E740481C1C}">
+                <a14:useLocalDpi xmlns:a14="http://schemas.microsoft.com/office/drawing/2010/main" val="0"/>
+              </a:ext>
+              <a:ext uri="{96DAC541-7B7A-43D3-8B79-37D633B846F1}">
+                <asvg:svgBlip xmlns:asvg="http://schemas.microsoft.com/office/drawing/2016/SVG/main" r:embed="rId7"/>
+              </a:ext>
+            </a:extLst>
+          </a:blip>
+          <a:stretch>
+            <a:fillRect/>
+          </a:stretch>
+        </p:blipFill>
+        <p:spPr>
+          <a:xfrm>
+            <a:off x="2178194" y="533275"/>
+            <a:ext cx="5486400" cy="5486400"/>
+          </a:xfrm>
+          <a:prstGeom prst="rect">
+            <a:avLst/>
+          </a:prstGeom>
+        </p:spPr>
+      </p:pic>
     </p:spTree>
     <p:extLst>
       <p:ext uri="{BB962C8B-B14F-4D97-AF65-F5344CB8AC3E}">
-        <p14:creationId xmlns:p14="http://schemas.microsoft.com/office/powerpoint/2010/main" val="4014324031"/>
+        <p14:creationId xmlns:p14="http://schemas.microsoft.com/office/powerpoint/2010/main" val="3794333621"/>
       </p:ext>
     </p:extLst>
   </p:cSld>

</xml_diff>